<commit_message>
add shadowing to pp
</commit_message>
<xml_diff>
--- a/512pp.pptx
+++ b/512pp.pptx
@@ -9662,6 +9662,144 @@
           </a:p>
         </p:txBody>
       </p:sp>
+      <p:sp>
+        <p:nvSpPr>
+          <p:cNvPr id="4" name="Rectangle 3"/>
+          <p:cNvSpPr/>
+          <p:nvPr/>
+        </p:nvSpPr>
+        <p:spPr>
+          <a:xfrm>
+            <a:off x="590309" y="1113304"/>
+            <a:ext cx="8079129" cy="1938992"/>
+          </a:xfrm>
+          <a:prstGeom prst="rect">
+            <a:avLst/>
+          </a:prstGeom>
+        </p:spPr>
+        <p:txBody>
+          <a:bodyPr wrap="square">
+            <a:spAutoFit/>
+          </a:bodyPr>
+          <a:lstStyle/>
+          <a:p>
+            <a:pPr marL="285750" indent="-285750">
+              <a:lnSpc>
+                <a:spcPct val="150000"/>
+              </a:lnSpc>
+              <a:buFont typeface="Arial"/>
+              <a:buChar char="•"/>
+            </a:pPr>
+            <a:r>
+              <a:rPr lang="en-US" sz="1600" dirty="0" smtClean="0">
+                <a:solidFill>
+                  <a:srgbClr val="024761"/>
+                </a:solidFill>
+                <a:latin typeface="Avenir Book"/>
+                <a:cs typeface="Avenir Book"/>
+              </a:rPr>
+              <a:t>Every RM has 2 versions of it’s files and a pointer file to determine current master.</a:t>
+            </a:r>
+          </a:p>
+          <a:p>
+            <a:pPr marL="285750" indent="-285750">
+              <a:lnSpc>
+                <a:spcPct val="150000"/>
+              </a:lnSpc>
+              <a:buFont typeface="Arial"/>
+              <a:buChar char="•"/>
+            </a:pPr>
+            <a:r>
+              <a:rPr lang="en-US" sz="1600" dirty="0" smtClean="0">
+                <a:solidFill>
+                  <a:srgbClr val="024761"/>
+                </a:solidFill>
+                <a:latin typeface="Avenir Book"/>
+                <a:cs typeface="Avenir Book"/>
+              </a:rPr>
+              <a:t>On save:</a:t>
+            </a:r>
+          </a:p>
+          <a:p>
+            <a:pPr marL="742950" lvl="1" indent="-285750">
+              <a:lnSpc>
+                <a:spcPct val="150000"/>
+              </a:lnSpc>
+              <a:buFont typeface="Arial"/>
+              <a:buChar char="•"/>
+            </a:pPr>
+            <a:r>
+              <a:rPr lang="en-US" sz="1600" dirty="0" smtClean="0">
+                <a:solidFill>
+                  <a:srgbClr val="024761"/>
+                </a:solidFill>
+                <a:latin typeface="Avenir Book"/>
+                <a:cs typeface="Avenir Book"/>
+              </a:rPr>
+              <a:t>Try to save to the  file not pointed to.</a:t>
+            </a:r>
+          </a:p>
+          <a:p>
+            <a:pPr marL="742950" lvl="1" indent="-285750">
+              <a:lnSpc>
+                <a:spcPct val="150000"/>
+              </a:lnSpc>
+              <a:buFont typeface="Arial"/>
+              <a:buChar char="•"/>
+            </a:pPr>
+            <a:r>
+              <a:rPr lang="en-US" sz="1600" dirty="0" smtClean="0">
+                <a:solidFill>
+                  <a:srgbClr val="024761"/>
+                </a:solidFill>
+                <a:latin typeface="Avenir Book"/>
+                <a:cs typeface="Avenir Book"/>
+              </a:rPr>
+              <a:t>Once the file was written, we update the pointer file.</a:t>
+            </a:r>
+          </a:p>
+          <a:p>
+            <a:pPr marL="285750" indent="-285750">
+              <a:lnSpc>
+                <a:spcPct val="150000"/>
+              </a:lnSpc>
+              <a:buFont typeface="Arial"/>
+              <a:buChar char="•"/>
+            </a:pPr>
+            <a:endParaRPr lang="en-US" sz="1600" dirty="0" smtClean="0">
+              <a:solidFill>
+                <a:srgbClr val="024761"/>
+              </a:solidFill>
+              <a:latin typeface="Avenir Book"/>
+              <a:cs typeface="Avenir Book"/>
+            </a:endParaRPr>
+          </a:p>
+        </p:txBody>
+      </p:sp>
+      <p:pic>
+        <p:nvPicPr>
+          <p:cNvPr id="7" name="Picture 6"/>
+          <p:cNvPicPr>
+            <a:picLocks noChangeAspect="1"/>
+          </p:cNvPicPr>
+          <p:nvPr/>
+        </p:nvPicPr>
+        <p:blipFill>
+          <a:blip r:embed="rId2"/>
+          <a:stretch>
+            <a:fillRect/>
+          </a:stretch>
+        </p:blipFill>
+        <p:spPr>
+          <a:xfrm>
+            <a:off x="1365973" y="3052296"/>
+            <a:ext cx="6527800" cy="3644900"/>
+          </a:xfrm>
+          <a:prstGeom prst="rect">
+            <a:avLst/>
+          </a:prstGeom>
+        </p:spPr>
+      </p:pic>
     </p:spTree>
     <p:extLst>
       <p:ext uri="{BB962C8B-B14F-4D97-AF65-F5344CB8AC3E}">

</xml_diff>